<commit_message>
Finish with GP16 state chart
- WIP: Need to do traceability chart
</commit_message>
<xml_diff>
--- a/ece-18-642/lec-15-to-19/gp16/gp12/gp07/gp07_NGUYEN_Todd_noid.pptx
+++ b/ece-18-642/lec-15-to-19/gp16/gp12/gp07/gp07_NGUYEN_Todd_noid.pptx
@@ -201,7 +201,7 @@
           <a:p>
             <a:fld id="{065D50C4-F9DE-4579-A940-E890F130168A}" type="datetimeFigureOut">
               <a:rPr lang="en-US" smtClean="0"/>
-              <a:t>2021-03-27</a:t>
+              <a:t>2021-04-04</a:t>
             </a:fld>
             <a:endParaRPr lang="en-US"/>
           </a:p>
@@ -600,7 +600,7 @@
           <a:p>
             <a:fld id="{E8557CB6-4DF2-454E-ABC9-30A60A3AEB68}" type="datetime1">
               <a:rPr lang="en-US" smtClean="0"/>
-              <a:t>2021-03-27</a:t>
+              <a:t>2021-04-04</a:t>
             </a:fld>
             <a:endParaRPr lang="en-US"/>
           </a:p>
@@ -786,7 +786,7 @@
           <a:p>
             <a:fld id="{34BF70C2-1023-44A4-98A6-B757A90D4AF8}" type="datetime1">
               <a:rPr lang="en-US" smtClean="0"/>
-              <a:t>2021-03-27</a:t>
+              <a:t>2021-04-04</a:t>
             </a:fld>
             <a:endParaRPr lang="en-US"/>
           </a:p>
@@ -970,7 +970,7 @@
           <a:p>
             <a:fld id="{1634F150-8679-4517-AF8C-D19735337D02}" type="datetime1">
               <a:rPr lang="en-US" smtClean="0"/>
-              <a:t>2021-03-27</a:t>
+              <a:t>2021-04-04</a:t>
             </a:fld>
             <a:endParaRPr lang="en-US"/>
           </a:p>
@@ -1144,7 +1144,7 @@
           <a:p>
             <a:fld id="{3BC0CF1B-8655-4AED-9A9E-306C7276293F}" type="datetime1">
               <a:rPr lang="en-US" smtClean="0"/>
-              <a:t>2021-03-27</a:t>
+              <a:t>2021-04-04</a:t>
             </a:fld>
             <a:endParaRPr lang="en-US"/>
           </a:p>
@@ -1406,7 +1406,7 @@
           <a:p>
             <a:fld id="{C9216115-32C9-4638-A572-3EE4E4F1B302}" type="datetime1">
               <a:rPr lang="en-US" smtClean="0"/>
-              <a:t>2021-03-27</a:t>
+              <a:t>2021-04-04</a:t>
             </a:fld>
             <a:endParaRPr lang="en-US"/>
           </a:p>
@@ -1654,7 +1654,7 @@
           <a:p>
             <a:fld id="{E83806C0-E6F2-424E-9E17-3394F2CAC167}" type="datetime1">
               <a:rPr lang="en-US" smtClean="0"/>
-              <a:t>2021-03-27</a:t>
+              <a:t>2021-04-04</a:t>
             </a:fld>
             <a:endParaRPr lang="en-US"/>
           </a:p>
@@ -2032,7 +2032,7 @@
           <a:p>
             <a:fld id="{E8C90ED4-DFAE-422E-B2A9-D466B675187E}" type="datetime1">
               <a:rPr lang="en-US" smtClean="0"/>
-              <a:t>2021-03-27</a:t>
+              <a:t>2021-04-04</a:t>
             </a:fld>
             <a:endParaRPr lang="en-US"/>
           </a:p>
@@ -2161,7 +2161,7 @@
           <a:p>
             <a:fld id="{E54899AC-4EA5-42F4-809E-7553FBFDD84D}" type="datetime1">
               <a:rPr lang="en-US" smtClean="0"/>
-              <a:t>2021-03-27</a:t>
+              <a:t>2021-04-04</a:t>
             </a:fld>
             <a:endParaRPr lang="en-US"/>
           </a:p>
@@ -2267,7 +2267,7 @@
           <a:p>
             <a:fld id="{571A050E-B635-4DAD-B4DD-5746EBF6F110}" type="datetime1">
               <a:rPr lang="en-US" smtClean="0"/>
-              <a:t>2021-03-27</a:t>
+              <a:t>2021-04-04</a:t>
             </a:fld>
             <a:endParaRPr lang="en-US"/>
           </a:p>
@@ -2555,7 +2555,7 @@
           <a:p>
             <a:fld id="{D16AE2A2-3C8D-460E-B818-CD0BD729B839}" type="datetime1">
               <a:rPr lang="en-US" smtClean="0"/>
-              <a:t>2021-03-27</a:t>
+              <a:t>2021-04-04</a:t>
             </a:fld>
             <a:endParaRPr lang="en-US"/>
           </a:p>
@@ -2823,7 +2823,7 @@
           <a:p>
             <a:fld id="{1E62E75C-07AE-40D4-9DF6-12B41D67C972}" type="datetime1">
               <a:rPr lang="en-US" smtClean="0"/>
-              <a:t>2021-03-27</a:t>
+              <a:t>2021-04-04</a:t>
             </a:fld>
             <a:endParaRPr lang="en-US"/>
           </a:p>
@@ -3054,7 +3054,7 @@
           <a:p>
             <a:fld id="{1313FE7F-F1B9-4A31-B8B0-55D1B638EE13}" type="datetime1">
               <a:rPr lang="en-US" smtClean="0"/>
-              <a:t>2021-03-27</a:t>
+              <a:t>2021-04-04</a:t>
             </a:fld>
             <a:endParaRPr lang="en-US"/>
           </a:p>
@@ -3734,32 +3734,37 @@
             <a:pPr lvl="1"/>
             <a:r>
               <a:rPr lang="en-US" sz="2000" dirty="0"/>
-              <a:t>PR-7c. Pressing SW2 and holding it for more than 5 seconds shall advance alarm time </a:t>
-            </a:r>
-            <a:r>
-              <a:rPr lang="en-US" sz="2000"/>
-              <a:t>at </a:t>
+              <a:t>PR-7c. Pressing SW2 and holding it for more than </a:t>
+            </a:r>
+            <a:r>
+              <a:rPr lang="en-US" sz="2000" dirty="0" smtClean="0"/>
+              <a:t>5 </a:t>
+            </a:r>
+            <a:r>
+              <a:rPr lang="en-US" sz="2000" dirty="0"/>
+              <a:t>seconds shall advance alarm time at </a:t>
             </a:r>
             <a:r>
               <a:rPr lang="en-US" sz="2000" smtClean="0"/>
-              <a:t>5</a:t>
+              <a:t>1 hour</a:t>
             </a:r>
             <a:r>
               <a:rPr lang="en-US" sz="2000" smtClean="0"/>
-              <a:t> </a:t>
-            </a:r>
-            <a:r>
-              <a:rPr lang="en-US" sz="2000" dirty="0" smtClean="0"/>
-              <a:t>minutes </a:t>
+              <a:t> of </a:t>
             </a:r>
             <a:r>
               <a:rPr lang="en-US" sz="2000" dirty="0"/>
-              <a:t>of alarm time per second that the button is held down. </a:t>
+              <a:t>alarm time per second that the button is held down. </a:t>
             </a:r>
             <a:r>
               <a:rPr lang="en-US" sz="2000" i="1" dirty="0"/>
-              <a:t>Rationale: speeds up large changes in alarm time.</a:t>
-            </a:r>
+              <a:t>Rationale: speeds up large changes in alarm time</a:t>
+            </a:r>
+            <a:r>
+              <a:rPr lang="en-US" sz="2000" i="1" dirty="0" smtClean="0"/>
+              <a:t>.</a:t>
+            </a:r>
+            <a:endParaRPr lang="en-US" sz="2000" i="1" dirty="0"/>
           </a:p>
         </p:txBody>
       </p:sp>

</xml_diff>